<commit_message>
a little bit update ppt
</commit_message>
<xml_diff>
--- a/Analysis/Donghyun_Kang-Comparison_Rankings.pptx
+++ b/Analysis/Donghyun_Kang-Comparison_Rankings.pptx
@@ -6,28 +6,30 @@
   </p:sldMasterIdLst>
   <p:sldIdLst>
     <p:sldId id="256" r:id="rId2"/>
-    <p:sldId id="258" r:id="rId3"/>
-    <p:sldId id="288" r:id="rId4"/>
-    <p:sldId id="259" r:id="rId5"/>
-    <p:sldId id="260" r:id="rId6"/>
-    <p:sldId id="289" r:id="rId7"/>
-    <p:sldId id="290" r:id="rId8"/>
-    <p:sldId id="291" r:id="rId9"/>
-    <p:sldId id="296" r:id="rId10"/>
-    <p:sldId id="292" r:id="rId11"/>
-    <p:sldId id="293" r:id="rId12"/>
-    <p:sldId id="294" r:id="rId13"/>
-    <p:sldId id="266" r:id="rId14"/>
-    <p:sldId id="275" r:id="rId15"/>
-    <p:sldId id="276" r:id="rId16"/>
-    <p:sldId id="280" r:id="rId17"/>
-    <p:sldId id="295" r:id="rId18"/>
-    <p:sldId id="282" r:id="rId19"/>
-    <p:sldId id="297" r:id="rId20"/>
-    <p:sldId id="274" r:id="rId21"/>
-    <p:sldId id="268" r:id="rId22"/>
-    <p:sldId id="262" r:id="rId23"/>
-    <p:sldId id="270" r:id="rId24"/>
+    <p:sldId id="298" r:id="rId3"/>
+    <p:sldId id="258" r:id="rId4"/>
+    <p:sldId id="288" r:id="rId5"/>
+    <p:sldId id="259" r:id="rId6"/>
+    <p:sldId id="299" r:id="rId7"/>
+    <p:sldId id="260" r:id="rId8"/>
+    <p:sldId id="289" r:id="rId9"/>
+    <p:sldId id="290" r:id="rId10"/>
+    <p:sldId id="291" r:id="rId11"/>
+    <p:sldId id="296" r:id="rId12"/>
+    <p:sldId id="292" r:id="rId13"/>
+    <p:sldId id="293" r:id="rId14"/>
+    <p:sldId id="294" r:id="rId15"/>
+    <p:sldId id="266" r:id="rId16"/>
+    <p:sldId id="275" r:id="rId17"/>
+    <p:sldId id="276" r:id="rId18"/>
+    <p:sldId id="280" r:id="rId19"/>
+    <p:sldId id="295" r:id="rId20"/>
+    <p:sldId id="282" r:id="rId21"/>
+    <p:sldId id="297" r:id="rId22"/>
+    <p:sldId id="274" r:id="rId23"/>
+    <p:sldId id="268" r:id="rId24"/>
+    <p:sldId id="262" r:id="rId25"/>
+    <p:sldId id="270" r:id="rId26"/>
   </p:sldIdLst>
   <p:sldSz cx="9144000" cy="6858000" type="screen4x3"/>
   <p:notesSz cx="6858000" cy="9144000"/>
@@ -310,7 +312,7 @@
           <a:p>
             <a:fld id="{FB30EDBD-1C2D-4C1E-B459-B60219FAB484}" type="datetimeFigureOut">
               <a:rPr lang="ko-KR" altLang="en-US" smtClean="0"/>
-              <a:t>2018-02-13</a:t>
+              <a:t>2018-02-14</a:t>
             </a:fld>
             <a:endParaRPr lang="ko-KR" altLang="en-US"/>
           </a:p>
@@ -475,7 +477,7 @@
           <a:p>
             <a:fld id="{FB30EDBD-1C2D-4C1E-B459-B60219FAB484}" type="datetimeFigureOut">
               <a:rPr lang="ko-KR" altLang="en-US" smtClean="0"/>
-              <a:t>2018-02-13</a:t>
+              <a:t>2018-02-14</a:t>
             </a:fld>
             <a:endParaRPr lang="ko-KR" altLang="en-US"/>
           </a:p>
@@ -650,7 +652,7 @@
           <a:p>
             <a:fld id="{FB30EDBD-1C2D-4C1E-B459-B60219FAB484}" type="datetimeFigureOut">
               <a:rPr lang="ko-KR" altLang="en-US" smtClean="0"/>
-              <a:t>2018-02-13</a:t>
+              <a:t>2018-02-14</a:t>
             </a:fld>
             <a:endParaRPr lang="ko-KR" altLang="en-US"/>
           </a:p>
@@ -826,7 +828,7 @@
           <a:p>
             <a:fld id="{FB30EDBD-1C2D-4C1E-B459-B60219FAB484}" type="datetimeFigureOut">
               <a:rPr lang="ko-KR" altLang="en-US" smtClean="0"/>
-              <a:t>2018-02-13</a:t>
+              <a:t>2018-02-14</a:t>
             </a:fld>
             <a:endParaRPr lang="ko-KR" altLang="en-US"/>
           </a:p>
@@ -1067,7 +1069,7 @@
           <a:p>
             <a:fld id="{FB30EDBD-1C2D-4C1E-B459-B60219FAB484}" type="datetimeFigureOut">
               <a:rPr lang="ko-KR" altLang="en-US" smtClean="0"/>
-              <a:t>2018-02-13</a:t>
+              <a:t>2018-02-14</a:t>
             </a:fld>
             <a:endParaRPr lang="ko-KR" altLang="en-US"/>
           </a:p>
@@ -1350,7 +1352,7 @@
           <a:p>
             <a:fld id="{FB30EDBD-1C2D-4C1E-B459-B60219FAB484}" type="datetimeFigureOut">
               <a:rPr lang="ko-KR" altLang="en-US" smtClean="0"/>
-              <a:t>2018-02-13</a:t>
+              <a:t>2018-02-14</a:t>
             </a:fld>
             <a:endParaRPr lang="ko-KR" altLang="en-US"/>
           </a:p>
@@ -1767,7 +1769,7 @@
           <a:p>
             <a:fld id="{FB30EDBD-1C2D-4C1E-B459-B60219FAB484}" type="datetimeFigureOut">
               <a:rPr lang="ko-KR" altLang="en-US" smtClean="0"/>
-              <a:t>2018-02-13</a:t>
+              <a:t>2018-02-14</a:t>
             </a:fld>
             <a:endParaRPr lang="ko-KR" altLang="en-US"/>
           </a:p>
@@ -1880,7 +1882,7 @@
           <a:p>
             <a:fld id="{FB30EDBD-1C2D-4C1E-B459-B60219FAB484}" type="datetimeFigureOut">
               <a:rPr lang="ko-KR" altLang="en-US" smtClean="0"/>
-              <a:t>2018-02-13</a:t>
+              <a:t>2018-02-14</a:t>
             </a:fld>
             <a:endParaRPr lang="ko-KR" altLang="en-US"/>
           </a:p>
@@ -1970,7 +1972,7 @@
           <a:p>
             <a:fld id="{FB30EDBD-1C2D-4C1E-B459-B60219FAB484}" type="datetimeFigureOut">
               <a:rPr lang="ko-KR" altLang="en-US" smtClean="0"/>
-              <a:t>2018-02-13</a:t>
+              <a:t>2018-02-14</a:t>
             </a:fld>
             <a:endParaRPr lang="ko-KR" altLang="en-US"/>
           </a:p>
@@ -2242,7 +2244,7 @@
           <a:p>
             <a:fld id="{FB30EDBD-1C2D-4C1E-B459-B60219FAB484}" type="datetimeFigureOut">
               <a:rPr lang="ko-KR" altLang="en-US" smtClean="0"/>
-              <a:t>2018-02-13</a:t>
+              <a:t>2018-02-14</a:t>
             </a:fld>
             <a:endParaRPr lang="ko-KR" altLang="en-US"/>
           </a:p>
@@ -2490,7 +2492,7 @@
           <a:p>
             <a:fld id="{FB30EDBD-1C2D-4C1E-B459-B60219FAB484}" type="datetimeFigureOut">
               <a:rPr lang="ko-KR" altLang="en-US" smtClean="0"/>
-              <a:t>2018-02-13</a:t>
+              <a:t>2018-02-14</a:t>
             </a:fld>
             <a:endParaRPr lang="ko-KR" altLang="en-US"/>
           </a:p>
@@ -2698,7 +2700,7 @@
           <a:p>
             <a:fld id="{FB30EDBD-1C2D-4C1E-B459-B60219FAB484}" type="datetimeFigureOut">
               <a:rPr lang="ko-KR" altLang="en-US" smtClean="0"/>
-              <a:t>2018-02-13</a:t>
+              <a:t>2018-02-14</a:t>
             </a:fld>
             <a:endParaRPr lang="ko-KR" altLang="en-US"/>
           </a:p>
@@ -3068,6 +3070,36 @@
           <a:chExt cx="0" cy="0"/>
         </a:xfrm>
       </p:grpSpPr>
+      <p:pic>
+        <p:nvPicPr>
+          <p:cNvPr id="9" name="그림 8"/>
+          <p:cNvPicPr>
+            <a:picLocks noChangeAspect="1"/>
+          </p:cNvPicPr>
+          <p:nvPr/>
+        </p:nvPicPr>
+        <p:blipFill>
+          <a:blip r:embed="rId2">
+            <a:extLst>
+              <a:ext uri="{28A0092B-C50C-407E-A947-70E740481C1C}">
+                <a14:useLocalDpi xmlns:a14="http://schemas.microsoft.com/office/drawing/2010/main" val="0"/>
+              </a:ext>
+            </a:extLst>
+          </a:blip>
+          <a:stretch>
+            <a:fillRect/>
+          </a:stretch>
+        </p:blipFill>
+        <p:spPr>
+          <a:xfrm>
+            <a:off x="0" y="980728"/>
+            <a:ext cx="9144000" cy="4286250"/>
+          </a:xfrm>
+          <a:prstGeom prst="rect">
+            <a:avLst/>
+          </a:prstGeom>
+        </p:spPr>
+      </p:pic>
       <p:sp>
         <p:nvSpPr>
           <p:cNvPr id="2" name="제목 1"/>
@@ -3153,7 +3185,7 @@
         </p:nvSpPr>
         <p:spPr>
           <a:xfrm>
-            <a:off x="611560" y="5085184"/>
+            <a:off x="611560" y="5373216"/>
             <a:ext cx="6400800" cy="1296144"/>
           </a:xfrm>
         </p:spPr>
@@ -3203,11 +3235,6 @@
               </a:rPr>
               <a:t>2018.02.13</a:t>
             </a:r>
-            <a:endParaRPr lang="en-US" altLang="ko-KR" sz="2600" dirty="0" smtClean="0">
-              <a:solidFill>
-                <a:schemeClr val="tx1"/>
-              </a:solidFill>
-            </a:endParaRPr>
           </a:p>
           <a:p>
             <a:pPr algn="l"/>
@@ -3394,36 +3421,6 @@
           </a:p>
         </p:txBody>
       </p:sp>
-      <p:pic>
-        <p:nvPicPr>
-          <p:cNvPr id="12" name="그림 11"/>
-          <p:cNvPicPr>
-            <a:picLocks noChangeAspect="1"/>
-          </p:cNvPicPr>
-          <p:nvPr/>
-        </p:nvPicPr>
-        <p:blipFill>
-          <a:blip r:embed="rId2" cstate="print">
-            <a:extLst>
-              <a:ext uri="{28A0092B-C50C-407E-A947-70E740481C1C}">
-                <a14:useLocalDpi xmlns:a14="http://schemas.microsoft.com/office/drawing/2010/main" val="0"/>
-              </a:ext>
-            </a:extLst>
-          </a:blip>
-          <a:stretch>
-            <a:fillRect/>
-          </a:stretch>
-        </p:blipFill>
-        <p:spPr>
-          <a:xfrm>
-            <a:off x="4355976" y="3212976"/>
-            <a:ext cx="4572000" cy="3429000"/>
-          </a:xfrm>
-          <a:prstGeom prst="rect">
-            <a:avLst/>
-          </a:prstGeom>
-        </p:spPr>
-      </p:pic>
     </p:spTree>
     <p:extLst>
       <p:ext uri="{BB962C8B-B14F-4D97-AF65-F5344CB8AC3E}">
@@ -3445,6 +3442,324 @@
 </file>
 
 <file path=ppt/slides/slide10.xml><?xml version="1.0" encoding="utf-8"?>
+<p:sld xmlns:a="http://schemas.openxmlformats.org/drawingml/2006/main" xmlns:r="http://schemas.openxmlformats.org/officeDocument/2006/relationships" xmlns:p="http://schemas.openxmlformats.org/presentationml/2006/main">
+  <p:cSld>
+    <p:spTree>
+      <p:nvGrpSpPr>
+        <p:cNvPr id="1" name=""/>
+        <p:cNvGrpSpPr/>
+        <p:nvPr/>
+      </p:nvGrpSpPr>
+      <p:grpSpPr>
+        <a:xfrm>
+          <a:off x="0" y="0"/>
+          <a:ext cx="0" cy="0"/>
+          <a:chOff x="0" y="0"/>
+          <a:chExt cx="0" cy="0"/>
+        </a:xfrm>
+      </p:grpSpPr>
+      <p:sp>
+        <p:nvSpPr>
+          <p:cNvPr id="2" name="제목 1"/>
+          <p:cNvSpPr>
+            <a:spLocks noGrp="1"/>
+          </p:cNvSpPr>
+          <p:nvPr>
+            <p:ph type="title"/>
+          </p:nvPr>
+        </p:nvSpPr>
+        <p:spPr/>
+        <p:txBody>
+          <a:bodyPr/>
+          <a:lstStyle/>
+          <a:p>
+            <a:r>
+              <a:rPr lang="en-US" altLang="ko-KR" dirty="0" smtClean="0"/>
+              <a:t>Billboard scraping</a:t>
+            </a:r>
+            <a:endParaRPr lang="ko-KR" altLang="en-US" dirty="0"/>
+          </a:p>
+        </p:txBody>
+      </p:sp>
+      <p:sp>
+        <p:nvSpPr>
+          <p:cNvPr id="4" name="직사각형 3"/>
+          <p:cNvSpPr/>
+          <p:nvPr/>
+        </p:nvSpPr>
+        <p:spPr>
+          <a:xfrm>
+            <a:off x="7208833" y="476672"/>
+            <a:ext cx="1611639" cy="504056"/>
+          </a:xfrm>
+          <a:prstGeom prst="rect">
+            <a:avLst/>
+          </a:prstGeom>
+          <a:scene3d>
+            <a:camera prst="perspectiveLeft"/>
+            <a:lightRig rig="threePt" dir="t"/>
+          </a:scene3d>
+        </p:spPr>
+        <p:style>
+          <a:lnRef idx="2">
+            <a:schemeClr val="accent1">
+              <a:shade val="50000"/>
+            </a:schemeClr>
+          </a:lnRef>
+          <a:fillRef idx="1">
+            <a:schemeClr val="accent1"/>
+          </a:fillRef>
+          <a:effectRef idx="0">
+            <a:schemeClr val="accent1"/>
+          </a:effectRef>
+          <a:fontRef idx="minor">
+            <a:schemeClr val="lt1"/>
+          </a:fontRef>
+        </p:style>
+        <p:txBody>
+          <a:bodyPr rtlCol="0" anchor="ctr"/>
+          <a:lstStyle/>
+          <a:p>
+            <a:pPr algn="ctr"/>
+            <a:r>
+              <a:rPr lang="en-US" altLang="ko-KR" sz="2000" b="1" dirty="0" err="1" smtClean="0">
+                <a:ln w="1905"/>
+                <a:gradFill>
+                  <a:gsLst>
+                    <a:gs pos="0">
+                      <a:schemeClr val="accent6">
+                        <a:shade val="20000"/>
+                        <a:satMod val="200000"/>
+                      </a:schemeClr>
+                    </a:gs>
+                    <a:gs pos="78000">
+                      <a:schemeClr val="accent6">
+                        <a:tint val="90000"/>
+                        <a:shade val="89000"/>
+                        <a:satMod val="220000"/>
+                      </a:schemeClr>
+                    </a:gs>
+                    <a:gs pos="100000">
+                      <a:schemeClr val="accent6">
+                        <a:tint val="12000"/>
+                        <a:satMod val="255000"/>
+                      </a:schemeClr>
+                    </a:gs>
+                  </a:gsLst>
+                  <a:lin ang="5400000"/>
+                </a:gradFill>
+                <a:effectLst>
+                  <a:innerShdw blurRad="69850" dist="43180" dir="5400000">
+                    <a:srgbClr val="000000">
+                      <a:alpha val="65000"/>
+                    </a:srgbClr>
+                  </a:innerShdw>
+                </a:effectLst>
+              </a:rPr>
+              <a:t>Scrapy</a:t>
+            </a:r>
+            <a:endParaRPr lang="ko-KR" altLang="en-US" sz="2000" b="1" dirty="0">
+              <a:ln w="1905"/>
+              <a:gradFill>
+                <a:gsLst>
+                  <a:gs pos="0">
+                    <a:schemeClr val="accent6">
+                      <a:shade val="20000"/>
+                      <a:satMod val="200000"/>
+                    </a:schemeClr>
+                  </a:gs>
+                  <a:gs pos="78000">
+                    <a:schemeClr val="accent6">
+                      <a:tint val="90000"/>
+                      <a:shade val="89000"/>
+                      <a:satMod val="220000"/>
+                    </a:schemeClr>
+                  </a:gs>
+                  <a:gs pos="100000">
+                    <a:schemeClr val="accent6">
+                      <a:tint val="12000"/>
+                      <a:satMod val="255000"/>
+                    </a:schemeClr>
+                  </a:gs>
+                </a:gsLst>
+                <a:lin ang="5400000"/>
+              </a:gradFill>
+              <a:effectLst>
+                <a:innerShdw blurRad="69850" dist="43180" dir="5400000">
+                  <a:srgbClr val="000000">
+                    <a:alpha val="65000"/>
+                  </a:srgbClr>
+                </a:innerShdw>
+              </a:effectLst>
+            </a:endParaRPr>
+          </a:p>
+        </p:txBody>
+      </p:sp>
+      <p:pic>
+        <p:nvPicPr>
+          <p:cNvPr id="5" name="그림 4"/>
+          <p:cNvPicPr>
+            <a:picLocks noChangeAspect="1"/>
+          </p:cNvPicPr>
+          <p:nvPr/>
+        </p:nvPicPr>
+        <p:blipFill>
+          <a:blip r:embed="rId2">
+            <a:extLst>
+              <a:ext uri="{28A0092B-C50C-407E-A947-70E740481C1C}">
+                <a14:useLocalDpi xmlns:a14="http://schemas.microsoft.com/office/drawing/2010/main" val="0"/>
+              </a:ext>
+            </a:extLst>
+          </a:blip>
+          <a:stretch>
+            <a:fillRect/>
+          </a:stretch>
+        </p:blipFill>
+        <p:spPr>
+          <a:xfrm>
+            <a:off x="0" y="1712354"/>
+            <a:ext cx="9144000" cy="3433291"/>
+          </a:xfrm>
+          <a:prstGeom prst="rect">
+            <a:avLst/>
+          </a:prstGeom>
+        </p:spPr>
+      </p:pic>
+    </p:spTree>
+    <p:extLst>
+      <p:ext uri="{BB962C8B-B14F-4D97-AF65-F5344CB8AC3E}">
+        <p14:creationId xmlns:p14="http://schemas.microsoft.com/office/powerpoint/2010/main" val="3780983472"/>
+      </p:ext>
+    </p:extLst>
+  </p:cSld>
+  <p:clrMapOvr>
+    <a:masterClrMapping/>
+  </p:clrMapOvr>
+  <p:timing>
+    <p:tnLst>
+      <p:par>
+        <p:cTn id="1" dur="indefinite" restart="never" nodeType="tmRoot"/>
+      </p:par>
+    </p:tnLst>
+  </p:timing>
+</p:sld>
+</file>
+
+<file path=ppt/slides/slide11.xml><?xml version="1.0" encoding="utf-8"?>
+<p:sld xmlns:a="http://schemas.openxmlformats.org/drawingml/2006/main" xmlns:r="http://schemas.openxmlformats.org/officeDocument/2006/relationships" xmlns:p="http://schemas.openxmlformats.org/presentationml/2006/main">
+  <p:cSld>
+    <p:spTree>
+      <p:nvGrpSpPr>
+        <p:cNvPr id="1" name=""/>
+        <p:cNvGrpSpPr/>
+        <p:nvPr/>
+      </p:nvGrpSpPr>
+      <p:grpSpPr>
+        <a:xfrm>
+          <a:off x="0" y="0"/>
+          <a:ext cx="0" cy="0"/>
+          <a:chOff x="0" y="0"/>
+          <a:chExt cx="0" cy="0"/>
+        </a:xfrm>
+      </p:grpSpPr>
+      <p:sp>
+        <p:nvSpPr>
+          <p:cNvPr id="2" name="제목 1"/>
+          <p:cNvSpPr>
+            <a:spLocks noGrp="1"/>
+          </p:cNvSpPr>
+          <p:nvPr>
+            <p:ph type="title"/>
+          </p:nvPr>
+        </p:nvSpPr>
+        <p:spPr/>
+        <p:txBody>
+          <a:bodyPr/>
+          <a:lstStyle/>
+          <a:p>
+            <a:r>
+              <a:rPr lang="en-US" altLang="ko-KR" dirty="0" smtClean="0"/>
+              <a:t>Why Spotify’s dataset ?</a:t>
+            </a:r>
+            <a:endParaRPr lang="ko-KR" altLang="en-US" dirty="0"/>
+          </a:p>
+        </p:txBody>
+      </p:sp>
+      <p:sp>
+        <p:nvSpPr>
+          <p:cNvPr id="3" name="내용 개체 틀 2"/>
+          <p:cNvSpPr>
+            <a:spLocks noGrp="1"/>
+          </p:cNvSpPr>
+          <p:nvPr>
+            <p:ph idx="1"/>
+          </p:nvPr>
+        </p:nvSpPr>
+        <p:spPr/>
+        <p:txBody>
+          <a:bodyPr/>
+          <a:lstStyle/>
+          <a:p>
+            <a:r>
+              <a:rPr lang="en-US" altLang="ko-KR" dirty="0" smtClean="0"/>
+              <a:t>Easy to web-scrape</a:t>
+            </a:r>
+          </a:p>
+          <a:p>
+            <a:r>
+              <a:rPr lang="en-US" altLang="ko-KR" dirty="0" smtClean="0"/>
+              <a:t>Easy to get (without web-scrape)</a:t>
+            </a:r>
+          </a:p>
+          <a:p>
+            <a:r>
+              <a:rPr lang="en-US" altLang="ko-KR" dirty="0" smtClean="0"/>
+              <a:t>Provide various data set</a:t>
+            </a:r>
+          </a:p>
+          <a:p>
+            <a:pPr lvl="1"/>
+            <a:r>
+              <a:rPr lang="en-US" altLang="ko-KR" dirty="0" smtClean="0"/>
+              <a:t>Regional, Daily, Weekly</a:t>
+            </a:r>
+          </a:p>
+          <a:p>
+            <a:r>
+              <a:rPr lang="en-US" altLang="ko-KR" dirty="0" smtClean="0"/>
+              <a:t>Long term monitored data</a:t>
+            </a:r>
+          </a:p>
+          <a:p>
+            <a:pPr lvl="1"/>
+            <a:r>
+              <a:rPr lang="en-US" altLang="ko-KR" dirty="0" smtClean="0"/>
+              <a:t>Every year</a:t>
+            </a:r>
+          </a:p>
+          <a:p>
+            <a:r>
+              <a:rPr lang="en-US" altLang="ko-KR" dirty="0" smtClean="0"/>
+              <a:t>Quick update</a:t>
+            </a:r>
+            <a:endParaRPr lang="ko-KR" altLang="en-US" dirty="0"/>
+          </a:p>
+        </p:txBody>
+      </p:sp>
+    </p:spTree>
+    <p:extLst>
+      <p:ext uri="{BB962C8B-B14F-4D97-AF65-F5344CB8AC3E}">
+        <p14:creationId xmlns:p14="http://schemas.microsoft.com/office/powerpoint/2010/main" val="1226395898"/>
+      </p:ext>
+    </p:extLst>
+  </p:cSld>
+  <p:clrMapOvr>
+    <a:masterClrMapping/>
+  </p:clrMapOvr>
+</p:sld>
+</file>
+
+<file path=ppt/slides/slide12.xml><?xml version="1.0" encoding="utf-8"?>
 <p:sld xmlns:a="http://schemas.openxmlformats.org/drawingml/2006/main" xmlns:r="http://schemas.openxmlformats.org/officeDocument/2006/relationships" xmlns:p="http://schemas.openxmlformats.org/presentationml/2006/main">
   <p:cSld>
     <p:spTree>
@@ -3768,7 +4083,7 @@
 </p:sld>
 </file>
 
-<file path=ppt/slides/slide11.xml><?xml version="1.0" encoding="utf-8"?>
+<file path=ppt/slides/slide13.xml><?xml version="1.0" encoding="utf-8"?>
 <p:sld xmlns:a="http://schemas.openxmlformats.org/drawingml/2006/main" xmlns:r="http://schemas.openxmlformats.org/officeDocument/2006/relationships" xmlns:p="http://schemas.openxmlformats.org/presentationml/2006/main">
   <p:cSld>
     <p:spTree>
@@ -4095,7 +4410,7 @@
 </p:sld>
 </file>
 
-<file path=ppt/slides/slide12.xml><?xml version="1.0" encoding="utf-8"?>
+<file path=ppt/slides/slide14.xml><?xml version="1.0" encoding="utf-8"?>
 <p:sld xmlns:a="http://schemas.openxmlformats.org/drawingml/2006/main" xmlns:r="http://schemas.openxmlformats.org/officeDocument/2006/relationships" xmlns:p="http://schemas.openxmlformats.org/presentationml/2006/main">
   <p:cSld>
     <p:spTree>
@@ -4472,7 +4787,7 @@
 </p:sld>
 </file>
 
-<file path=ppt/slides/slide13.xml><?xml version="1.0" encoding="utf-8"?>
+<file path=ppt/slides/slide15.xml><?xml version="1.0" encoding="utf-8"?>
 <p:sld xmlns:a="http://schemas.openxmlformats.org/drawingml/2006/main" xmlns:r="http://schemas.openxmlformats.org/officeDocument/2006/relationships" xmlns:p="http://schemas.openxmlformats.org/presentationml/2006/main">
   <p:cSld>
     <p:spTree>
@@ -4715,7 +5030,7 @@
 </p:sld>
 </file>
 
-<file path=ppt/slides/slide14.xml><?xml version="1.0" encoding="utf-8"?>
+<file path=ppt/slides/slide16.xml><?xml version="1.0" encoding="utf-8"?>
 <p:sld xmlns:a="http://schemas.openxmlformats.org/drawingml/2006/main" xmlns:r="http://schemas.openxmlformats.org/officeDocument/2006/relationships" xmlns:p="http://schemas.openxmlformats.org/presentationml/2006/main">
   <p:cSld>
     <p:spTree>
@@ -4912,7 +5227,7 @@
 </p:sld>
 </file>
 
-<file path=ppt/slides/slide15.xml><?xml version="1.0" encoding="utf-8"?>
+<file path=ppt/slides/slide17.xml><?xml version="1.0" encoding="utf-8"?>
 <p:sld xmlns:a="http://schemas.openxmlformats.org/drawingml/2006/main" xmlns:r="http://schemas.openxmlformats.org/officeDocument/2006/relationships" xmlns:p="http://schemas.openxmlformats.org/presentationml/2006/main">
   <p:cSld>
     <p:spTree>
@@ -5001,7 +5316,7 @@
 </p:sld>
 </file>
 
-<file path=ppt/slides/slide16.xml><?xml version="1.0" encoding="utf-8"?>
+<file path=ppt/slides/slide18.xml><?xml version="1.0" encoding="utf-8"?>
 <p:sld xmlns:a="http://schemas.openxmlformats.org/drawingml/2006/main" xmlns:r="http://schemas.openxmlformats.org/officeDocument/2006/relationships" xmlns:p="http://schemas.openxmlformats.org/presentationml/2006/main">
   <p:cSld>
     <p:spTree>
@@ -5150,7 +5465,7 @@
 </p:sld>
 </file>
 
-<file path=ppt/slides/slide17.xml><?xml version="1.0" encoding="utf-8"?>
+<file path=ppt/slides/slide19.xml><?xml version="1.0" encoding="utf-8"?>
 <p:sld xmlns:a="http://schemas.openxmlformats.org/drawingml/2006/main" xmlns:r="http://schemas.openxmlformats.org/officeDocument/2006/relationships" xmlns:p="http://schemas.openxmlformats.org/presentationml/2006/main">
   <p:cSld>
     <p:spTree>
@@ -5239,7 +5554,135 @@
 </p:sld>
 </file>
 
-<file path=ppt/slides/slide18.xml><?xml version="1.0" encoding="utf-8"?>
+<file path=ppt/slides/slide2.xml><?xml version="1.0" encoding="utf-8"?>
+<p:sld xmlns:a="http://schemas.openxmlformats.org/drawingml/2006/main" xmlns:r="http://schemas.openxmlformats.org/officeDocument/2006/relationships" xmlns:p="http://schemas.openxmlformats.org/presentationml/2006/main">
+  <p:cSld>
+    <p:spTree>
+      <p:nvGrpSpPr>
+        <p:cNvPr id="1" name=""/>
+        <p:cNvGrpSpPr/>
+        <p:nvPr/>
+      </p:nvGrpSpPr>
+      <p:grpSpPr>
+        <a:xfrm>
+          <a:off x="0" y="0"/>
+          <a:ext cx="0" cy="0"/>
+          <a:chOff x="0" y="0"/>
+          <a:chExt cx="0" cy="0"/>
+        </a:xfrm>
+      </p:grpSpPr>
+      <p:sp>
+        <p:nvSpPr>
+          <p:cNvPr id="2" name="제목 1"/>
+          <p:cNvSpPr>
+            <a:spLocks noGrp="1"/>
+          </p:cNvSpPr>
+          <p:nvPr>
+            <p:ph type="title"/>
+          </p:nvPr>
+        </p:nvSpPr>
+        <p:spPr/>
+        <p:txBody>
+          <a:bodyPr/>
+          <a:lstStyle/>
+          <a:p>
+            <a:r>
+              <a:rPr lang="en-US" altLang="ko-KR" dirty="0" smtClean="0">
+                <a:solidFill>
+                  <a:schemeClr val="tx2"/>
+                </a:solidFill>
+              </a:rPr>
+              <a:t>Motivation</a:t>
+            </a:r>
+            <a:endParaRPr lang="ko-KR" altLang="en-US" dirty="0">
+              <a:solidFill>
+                <a:schemeClr val="tx2"/>
+              </a:solidFill>
+            </a:endParaRPr>
+          </a:p>
+        </p:txBody>
+      </p:sp>
+      <p:pic>
+        <p:nvPicPr>
+          <p:cNvPr id="3" name="그림 2"/>
+          <p:cNvPicPr>
+            <a:picLocks noChangeAspect="1"/>
+          </p:cNvPicPr>
+          <p:nvPr/>
+        </p:nvPicPr>
+        <p:blipFill>
+          <a:blip r:embed="rId2" cstate="print">
+            <a:extLst>
+              <a:ext uri="{28A0092B-C50C-407E-A947-70E740481C1C}">
+                <a14:useLocalDpi xmlns:a14="http://schemas.microsoft.com/office/drawing/2010/main" val="0"/>
+              </a:ext>
+            </a:extLst>
+          </a:blip>
+          <a:stretch>
+            <a:fillRect/>
+          </a:stretch>
+        </p:blipFill>
+        <p:spPr>
+          <a:xfrm>
+            <a:off x="4457630" y="3356992"/>
+            <a:ext cx="4539787" cy="3364934"/>
+          </a:xfrm>
+          <a:prstGeom prst="rect">
+            <a:avLst/>
+          </a:prstGeom>
+        </p:spPr>
+      </p:pic>
+      <p:pic>
+        <p:nvPicPr>
+          <p:cNvPr id="5" name="그림 4"/>
+          <p:cNvPicPr>
+            <a:picLocks noChangeAspect="1"/>
+          </p:cNvPicPr>
+          <p:nvPr/>
+        </p:nvPicPr>
+        <p:blipFill>
+          <a:blip r:embed="rId3" cstate="print">
+            <a:extLst>
+              <a:ext uri="{28A0092B-C50C-407E-A947-70E740481C1C}">
+                <a14:useLocalDpi xmlns:a14="http://schemas.microsoft.com/office/drawing/2010/main" val="0"/>
+              </a:ext>
+            </a:extLst>
+          </a:blip>
+          <a:stretch>
+            <a:fillRect/>
+          </a:stretch>
+        </p:blipFill>
+        <p:spPr>
+          <a:xfrm>
+            <a:off x="107504" y="1492726"/>
+            <a:ext cx="4572000" cy="3429000"/>
+          </a:xfrm>
+          <a:prstGeom prst="rect">
+            <a:avLst/>
+          </a:prstGeom>
+        </p:spPr>
+      </p:pic>
+    </p:spTree>
+    <p:extLst>
+      <p:ext uri="{BB962C8B-B14F-4D97-AF65-F5344CB8AC3E}">
+        <p14:creationId xmlns:p14="http://schemas.microsoft.com/office/powerpoint/2010/main" val="2531188282"/>
+      </p:ext>
+    </p:extLst>
+  </p:cSld>
+  <p:clrMapOvr>
+    <a:masterClrMapping/>
+  </p:clrMapOvr>
+  <p:timing>
+    <p:tnLst>
+      <p:par>
+        <p:cTn id="1" dur="indefinite" restart="never" nodeType="tmRoot"/>
+      </p:par>
+    </p:tnLst>
+  </p:timing>
+</p:sld>
+</file>
+
+<file path=ppt/slides/slide20.xml><?xml version="1.0" encoding="utf-8"?>
 <p:sld xmlns:a="http://schemas.openxmlformats.org/drawingml/2006/main" xmlns:r="http://schemas.openxmlformats.org/officeDocument/2006/relationships" xmlns:p="http://schemas.openxmlformats.org/presentationml/2006/main">
   <p:cSld>
     <p:spTree>
@@ -5352,7 +5795,7 @@
 </p:sld>
 </file>
 
-<file path=ppt/slides/slide19.xml><?xml version="1.0" encoding="utf-8"?>
+<file path=ppt/slides/slide21.xml><?xml version="1.0" encoding="utf-8"?>
 <p:sld xmlns:a="http://schemas.openxmlformats.org/drawingml/2006/main" xmlns:r="http://schemas.openxmlformats.org/officeDocument/2006/relationships" xmlns:p="http://schemas.openxmlformats.org/presentationml/2006/main">
   <p:cSld>
     <p:spTree>
@@ -5466,105 +5909,7 @@
 </p:sld>
 </file>
 
-<file path=ppt/slides/slide2.xml><?xml version="1.0" encoding="utf-8"?>
-<p:sld xmlns:a="http://schemas.openxmlformats.org/drawingml/2006/main" xmlns:r="http://schemas.openxmlformats.org/officeDocument/2006/relationships" xmlns:p="http://schemas.openxmlformats.org/presentationml/2006/main">
-  <p:cSld>
-    <p:spTree>
-      <p:nvGrpSpPr>
-        <p:cNvPr id="1" name=""/>
-        <p:cNvGrpSpPr/>
-        <p:nvPr/>
-      </p:nvGrpSpPr>
-      <p:grpSpPr>
-        <a:xfrm>
-          <a:off x="0" y="0"/>
-          <a:ext cx="0" cy="0"/>
-          <a:chOff x="0" y="0"/>
-          <a:chExt cx="0" cy="0"/>
-        </a:xfrm>
-      </p:grpSpPr>
-      <p:pic>
-        <p:nvPicPr>
-          <p:cNvPr id="4" name="그림 3"/>
-          <p:cNvPicPr>
-            <a:picLocks noChangeAspect="1"/>
-          </p:cNvPicPr>
-          <p:nvPr/>
-        </p:nvPicPr>
-        <p:blipFill>
-          <a:blip r:embed="rId2" cstate="print">
-            <a:extLst>
-              <a:ext uri="{28A0092B-C50C-407E-A947-70E740481C1C}">
-                <a14:useLocalDpi xmlns:a14="http://schemas.microsoft.com/office/drawing/2010/main" val="0"/>
-              </a:ext>
-            </a:extLst>
-          </a:blip>
-          <a:stretch>
-            <a:fillRect/>
-          </a:stretch>
-        </p:blipFill>
-        <p:spPr>
-          <a:xfrm>
-            <a:off x="1205880" y="1412776"/>
-            <a:ext cx="6732240" cy="5049180"/>
-          </a:xfrm>
-          <a:prstGeom prst="rect">
-            <a:avLst/>
-          </a:prstGeom>
-        </p:spPr>
-      </p:pic>
-      <p:sp>
-        <p:nvSpPr>
-          <p:cNvPr id="2" name="제목 1"/>
-          <p:cNvSpPr>
-            <a:spLocks noGrp="1"/>
-          </p:cNvSpPr>
-          <p:nvPr>
-            <p:ph type="title"/>
-          </p:nvPr>
-        </p:nvSpPr>
-        <p:spPr/>
-        <p:txBody>
-          <a:bodyPr/>
-          <a:lstStyle/>
-          <a:p>
-            <a:r>
-              <a:rPr lang="en-US" altLang="ko-KR" dirty="0" smtClean="0">
-                <a:solidFill>
-                  <a:schemeClr val="tx2"/>
-                </a:solidFill>
-              </a:rPr>
-              <a:t>Motivation</a:t>
-            </a:r>
-            <a:endParaRPr lang="ko-KR" altLang="en-US" dirty="0">
-              <a:solidFill>
-                <a:schemeClr val="tx2"/>
-              </a:solidFill>
-            </a:endParaRPr>
-          </a:p>
-        </p:txBody>
-      </p:sp>
-    </p:spTree>
-    <p:extLst>
-      <p:ext uri="{BB962C8B-B14F-4D97-AF65-F5344CB8AC3E}">
-        <p14:creationId xmlns:p14="http://schemas.microsoft.com/office/powerpoint/2010/main" val="2484361006"/>
-      </p:ext>
-    </p:extLst>
-  </p:cSld>
-  <p:clrMapOvr>
-    <a:masterClrMapping/>
-  </p:clrMapOvr>
-  <p:timing>
-    <p:tnLst>
-      <p:par>
-        <p:cTn id="1" dur="indefinite" restart="never" nodeType="tmRoot"/>
-      </p:par>
-    </p:tnLst>
-  </p:timing>
-</p:sld>
-</file>
-
-<file path=ppt/slides/slide20.xml><?xml version="1.0" encoding="utf-8"?>
+<file path=ppt/slides/slide22.xml><?xml version="1.0" encoding="utf-8"?>
 <p:sld xmlns:a="http://schemas.openxmlformats.org/drawingml/2006/main" xmlns:r="http://schemas.openxmlformats.org/officeDocument/2006/relationships" xmlns:p="http://schemas.openxmlformats.org/presentationml/2006/main">
   <p:cSld>
     <p:spTree>
@@ -10772,7 +11117,7 @@
 </p:sld>
 </file>
 
-<file path=ppt/slides/slide21.xml><?xml version="1.0" encoding="utf-8"?>
+<file path=ppt/slides/slide23.xml><?xml version="1.0" encoding="utf-8"?>
 <p:sld xmlns:a="http://schemas.openxmlformats.org/drawingml/2006/main" xmlns:r="http://schemas.openxmlformats.org/officeDocument/2006/relationships" xmlns:p="http://schemas.openxmlformats.org/presentationml/2006/main">
   <p:cSld>
     <p:spTree>
@@ -11121,7 +11466,6 @@
               <a:rPr lang="en-US" altLang="ko-KR" u="sng" dirty="0"/>
               <a:t>downloaded stream</a:t>
             </a:r>
-            <a:endParaRPr lang="en-US" altLang="ko-KR" u="sng" dirty="0"/>
           </a:p>
         </p:txBody>
       </p:sp>
@@ -11159,7 +11503,6 @@
               <a:rPr lang="en-US" altLang="ko-KR" dirty="0"/>
               <a:t> music on YouTube by video, artist, track, and viral score</a:t>
             </a:r>
-            <a:endParaRPr lang="en-US" altLang="ko-KR" dirty="0"/>
           </a:p>
         </p:txBody>
       </p:sp>
@@ -11215,7 +11558,6 @@
               <a:rPr lang="en-US" altLang="ko-KR" dirty="0"/>
               <a:t>as compiled by Nielsen Music and streaming activity data provided by online music sources</a:t>
             </a:r>
-            <a:endParaRPr lang="en-US" altLang="ko-KR" dirty="0"/>
           </a:p>
         </p:txBody>
       </p:sp>
@@ -11333,7 +11675,7 @@
 </p:sld>
 </file>
 
-<file path=ppt/slides/slide22.xml><?xml version="1.0" encoding="utf-8"?>
+<file path=ppt/slides/slide24.xml><?xml version="1.0" encoding="utf-8"?>
 <p:sld xmlns:a="http://schemas.openxmlformats.org/drawingml/2006/main" xmlns:r="http://schemas.openxmlformats.org/officeDocument/2006/relationships" xmlns:p="http://schemas.openxmlformats.org/presentationml/2006/main">
   <p:cSld>
     <p:spTree>
@@ -11394,7 +11736,6 @@
               <a:rPr lang="en-US" altLang="ko-KR" dirty="0" smtClean="0"/>
               <a:t>Data Survey</a:t>
             </a:r>
-            <a:endParaRPr lang="en-US" altLang="ko-KR" dirty="0" smtClean="0"/>
           </a:p>
           <a:p>
             <a:pPr lvl="1"/>
@@ -11402,7 +11743,6 @@
               <a:rPr lang="en-US" altLang="ko-KR" dirty="0" smtClean="0"/>
               <a:t>Regional subscriber distribution</a:t>
             </a:r>
-            <a:endParaRPr lang="en-US" altLang="ko-KR" dirty="0" smtClean="0"/>
           </a:p>
           <a:p>
             <a:pPr lvl="1"/>
@@ -11410,14 +11750,12 @@
               <a:rPr lang="en-US" altLang="ko-KR" dirty="0" smtClean="0"/>
               <a:t>Weather, Airplay data</a:t>
             </a:r>
-            <a:endParaRPr lang="en-US" altLang="ko-KR" dirty="0" smtClean="0"/>
           </a:p>
           <a:p>
             <a:r>
               <a:rPr lang="en-US" altLang="ko-KR" dirty="0" smtClean="0"/>
               <a:t>Analysis</a:t>
             </a:r>
-            <a:endParaRPr lang="en-US" altLang="ko-KR" dirty="0" smtClean="0"/>
           </a:p>
           <a:p>
             <a:pPr lvl="1"/>
@@ -11468,7 +11806,7 @@
 </p:sld>
 </file>
 
-<file path=ppt/slides/slide23.xml><?xml version="1.0" encoding="utf-8"?>
+<file path=ppt/slides/slide25.xml><?xml version="1.0" encoding="utf-8"?>
 <p:sld xmlns:a="http://schemas.openxmlformats.org/drawingml/2006/main" xmlns:r="http://schemas.openxmlformats.org/officeDocument/2006/relationships" xmlns:p="http://schemas.openxmlformats.org/presentationml/2006/main">
   <p:cSld>
     <p:spTree>
@@ -11559,6 +11897,36 @@
           <a:chExt cx="0" cy="0"/>
         </a:xfrm>
       </p:grpSpPr>
+      <p:pic>
+        <p:nvPicPr>
+          <p:cNvPr id="4" name="그림 3"/>
+          <p:cNvPicPr>
+            <a:picLocks noChangeAspect="1"/>
+          </p:cNvPicPr>
+          <p:nvPr/>
+        </p:nvPicPr>
+        <p:blipFill>
+          <a:blip r:embed="rId2" cstate="print">
+            <a:extLst>
+              <a:ext uri="{28A0092B-C50C-407E-A947-70E740481C1C}">
+                <a14:useLocalDpi xmlns:a14="http://schemas.microsoft.com/office/drawing/2010/main" val="0"/>
+              </a:ext>
+            </a:extLst>
+          </a:blip>
+          <a:stretch>
+            <a:fillRect/>
+          </a:stretch>
+        </p:blipFill>
+        <p:spPr>
+          <a:xfrm>
+            <a:off x="1007604" y="1340768"/>
+            <a:ext cx="7128792" cy="5346594"/>
+          </a:xfrm>
+          <a:prstGeom prst="rect">
+            <a:avLst/>
+          </a:prstGeom>
+        </p:spPr>
+      </p:pic>
       <p:sp>
         <p:nvSpPr>
           <p:cNvPr id="2" name="제목 1"/>
@@ -11590,73 +11958,10 @@
           </a:p>
         </p:txBody>
       </p:sp>
-      <p:sp>
-        <p:nvSpPr>
-          <p:cNvPr id="5" name="내용 개체 틀 2"/>
-          <p:cNvSpPr>
-            <a:spLocks noGrp="1"/>
-          </p:cNvSpPr>
-          <p:nvPr>
-            <p:ph idx="1"/>
-          </p:nvPr>
-        </p:nvSpPr>
-        <p:spPr>
-          <a:xfrm>
-            <a:off x="457200" y="1600200"/>
-            <a:ext cx="8229600" cy="4525963"/>
-          </a:xfrm>
-        </p:spPr>
-        <p:txBody>
-          <a:bodyPr>
-            <a:normAutofit/>
-          </a:bodyPr>
-          <a:lstStyle/>
-          <a:p>
-            <a:pPr marL="0" lvl="0" indent="0" fontAlgn="base" latinLnBrk="0">
-              <a:buNone/>
-            </a:pPr>
-            <a:r>
-              <a:rPr lang="en-US" altLang="ko-KR" dirty="0" smtClean="0"/>
-              <a:t>- Spotify is really making a music trend?</a:t>
-            </a:r>
-          </a:p>
-          <a:p>
-            <a:pPr marL="0" lvl="0" indent="0" fontAlgn="base" latinLnBrk="0">
-              <a:buNone/>
-            </a:pPr>
-            <a:endParaRPr lang="en-US" altLang="ko-KR" dirty="0"/>
-          </a:p>
-          <a:p>
-            <a:pPr marL="0" lvl="0" indent="0" fontAlgn="base" latinLnBrk="0">
-              <a:buNone/>
-            </a:pPr>
-            <a:r>
-              <a:rPr lang="en-US" altLang="ko-KR" dirty="0" smtClean="0"/>
-              <a:t>- Why many people uses Spotify’s data?</a:t>
-            </a:r>
-          </a:p>
-          <a:p>
-            <a:pPr marL="0" lvl="0" indent="0" fontAlgn="base" latinLnBrk="0">
-              <a:buNone/>
-            </a:pPr>
-            <a:endParaRPr lang="en-US" altLang="ko-KR" dirty="0"/>
-          </a:p>
-          <a:p>
-            <a:pPr marL="0" lvl="0" indent="0" fontAlgn="base" latinLnBrk="0">
-              <a:buNone/>
-            </a:pPr>
-            <a:r>
-              <a:rPr lang="en-US" altLang="ko-KR" dirty="0" smtClean="0"/>
-              <a:t>- Are these reliable?</a:t>
-            </a:r>
-            <a:endParaRPr lang="ko-KR" altLang="en-US" dirty="0"/>
-          </a:p>
-        </p:txBody>
-      </p:sp>
     </p:spTree>
     <p:extLst>
       <p:ext uri="{BB962C8B-B14F-4D97-AF65-F5344CB8AC3E}">
-        <p14:creationId xmlns:p14="http://schemas.microsoft.com/office/powerpoint/2010/main" val="1767026410"/>
+        <p14:creationId xmlns:p14="http://schemas.microsoft.com/office/powerpoint/2010/main" val="2484361006"/>
       </p:ext>
     </p:extLst>
   </p:cSld>
@@ -11706,16 +12011,24 @@
           <a:lstStyle/>
           <a:p>
             <a:r>
-              <a:rPr lang="en-US" altLang="ko-KR" dirty="0" smtClean="0"/>
-              <a:t>Analysis points</a:t>
-            </a:r>
-            <a:endParaRPr lang="ko-KR" altLang="en-US" dirty="0"/>
+              <a:rPr lang="en-US" altLang="ko-KR" dirty="0" smtClean="0">
+                <a:solidFill>
+                  <a:schemeClr val="tx2"/>
+                </a:solidFill>
+              </a:rPr>
+              <a:t>Motivation</a:t>
+            </a:r>
+            <a:endParaRPr lang="ko-KR" altLang="en-US" dirty="0">
+              <a:solidFill>
+                <a:schemeClr val="tx2"/>
+              </a:solidFill>
+            </a:endParaRPr>
           </a:p>
         </p:txBody>
       </p:sp>
       <p:sp>
         <p:nvSpPr>
-          <p:cNvPr id="9" name="내용 개체 틀 2"/>
+          <p:cNvPr id="5" name="내용 개체 틀 2"/>
           <p:cNvSpPr>
             <a:spLocks noGrp="1"/>
           </p:cNvSpPr>
@@ -11739,14 +12052,7 @@
               <a:buNone/>
             </a:pPr>
             <a:r>
-              <a:rPr lang="en-US" altLang="ko-KR" dirty="0" smtClean="0">
-                <a:solidFill>
-                  <a:schemeClr val="bg1">
-                    <a:lumMod val="85000"/>
-                    <a:lumOff val="15000"/>
-                  </a:schemeClr>
-                </a:solidFill>
-              </a:rPr>
+              <a:rPr lang="en-US" altLang="ko-KR" dirty="0" smtClean="0"/>
               <a:t>- Spotify is really making a music trend?</a:t>
             </a:r>
           </a:p>
@@ -11754,16 +12060,6 @@
             <a:pPr marL="0" lvl="0" indent="0" fontAlgn="base" latinLnBrk="0">
               <a:buNone/>
             </a:pPr>
-            <a:r>
-              <a:rPr lang="en-US" altLang="ko-KR" dirty="0" smtClean="0"/>
-              <a:t>  </a:t>
-            </a:r>
-            <a:r>
-              <a:rPr lang="en-US" altLang="ko-KR" dirty="0" smtClean="0">
-                <a:sym typeface="Wingdings" panose="05000000000000000000" pitchFamily="2" charset="2"/>
-              </a:rPr>
-              <a:t> Compare with others’ list</a:t>
-            </a:r>
             <a:endParaRPr lang="en-US" altLang="ko-KR" dirty="0"/>
           </a:p>
           <a:p>
@@ -11771,14 +12067,7 @@
               <a:buNone/>
             </a:pPr>
             <a:r>
-              <a:rPr lang="en-US" altLang="ko-KR" dirty="0" smtClean="0">
-                <a:solidFill>
-                  <a:schemeClr val="bg1">
-                    <a:lumMod val="85000"/>
-                    <a:lumOff val="15000"/>
-                  </a:schemeClr>
-                </a:solidFill>
-              </a:rPr>
+              <a:rPr lang="en-US" altLang="ko-KR" dirty="0" smtClean="0"/>
               <a:t>- Why many people uses Spotify’s data?</a:t>
             </a:r>
           </a:p>
@@ -11786,34 +12075,7 @@
             <a:pPr marL="0" lvl="0" indent="0" fontAlgn="base" latinLnBrk="0">
               <a:buNone/>
             </a:pPr>
-            <a:r>
-              <a:rPr lang="en-US" altLang="ko-KR" dirty="0" smtClean="0"/>
-              <a:t>  </a:t>
-            </a:r>
-            <a:r>
-              <a:rPr lang="en-US" altLang="ko-KR" dirty="0" smtClean="0">
-                <a:sym typeface="Wingdings" panose="05000000000000000000" pitchFamily="2" charset="2"/>
-              </a:rPr>
-              <a:t> Web scraping and using it</a:t>
-            </a:r>
             <a:endParaRPr lang="en-US" altLang="ko-KR" dirty="0"/>
-          </a:p>
-          <a:p>
-            <a:pPr lvl="0" fontAlgn="base" latinLnBrk="0">
-              <a:buFontTx/>
-              <a:buChar char="-"/>
-            </a:pPr>
-            <a:r>
-              <a:rPr lang="en-US" altLang="ko-KR" dirty="0" smtClean="0">
-                <a:solidFill>
-                  <a:schemeClr val="bg1">
-                    <a:lumMod val="85000"/>
-                    <a:lumOff val="15000"/>
-                  </a:schemeClr>
-                </a:solidFill>
-              </a:rPr>
-              <a:t>Are these reliable?</a:t>
-            </a:r>
           </a:p>
           <a:p>
             <a:pPr marL="0" lvl="0" indent="0" fontAlgn="base" latinLnBrk="0">
@@ -11821,13 +12083,7 @@
             </a:pPr>
             <a:r>
               <a:rPr lang="en-US" altLang="ko-KR" dirty="0" smtClean="0"/>
-              <a:t>  </a:t>
-            </a:r>
-            <a:r>
-              <a:rPr lang="en-US" altLang="ko-KR" dirty="0" smtClean="0">
-                <a:sym typeface="Wingdings" panose="05000000000000000000" pitchFamily="2" charset="2"/>
-              </a:rPr>
-              <a:t> …</a:t>
+              <a:t>- Are these reliable?</a:t>
             </a:r>
             <a:endParaRPr lang="ko-KR" altLang="en-US" dirty="0"/>
           </a:p>
@@ -11836,7 +12092,7 @@
     </p:spTree>
     <p:extLst>
       <p:ext uri="{BB962C8B-B14F-4D97-AF65-F5344CB8AC3E}">
-        <p14:creationId xmlns:p14="http://schemas.microsoft.com/office/powerpoint/2010/main" val="3658189680"/>
+        <p14:creationId xmlns:p14="http://schemas.microsoft.com/office/powerpoint/2010/main" val="1767026410"/>
       </p:ext>
     </p:extLst>
   </p:cSld>
@@ -11887,11 +12143,274 @@
           <a:p>
             <a:r>
               <a:rPr lang="en-US" altLang="ko-KR" dirty="0" smtClean="0"/>
-              <a:t>Data </a:t>
-            </a:r>
+              <a:t>Analysis points</a:t>
+            </a:r>
+            <a:endParaRPr lang="ko-KR" altLang="en-US" dirty="0"/>
+          </a:p>
+        </p:txBody>
+      </p:sp>
+      <p:sp>
+        <p:nvSpPr>
+          <p:cNvPr id="9" name="내용 개체 틀 2"/>
+          <p:cNvSpPr>
+            <a:spLocks noGrp="1"/>
+          </p:cNvSpPr>
+          <p:nvPr>
+            <p:ph idx="1"/>
+          </p:nvPr>
+        </p:nvSpPr>
+        <p:spPr>
+          <a:xfrm>
+            <a:off x="457200" y="1600200"/>
+            <a:ext cx="8229600" cy="4525963"/>
+          </a:xfrm>
+        </p:spPr>
+        <p:txBody>
+          <a:bodyPr>
+            <a:normAutofit/>
+          </a:bodyPr>
+          <a:lstStyle/>
+          <a:p>
+            <a:pPr marL="0" lvl="0" indent="0" fontAlgn="base" latinLnBrk="0">
+              <a:buNone/>
+            </a:pPr>
+            <a:r>
+              <a:rPr lang="en-US" altLang="ko-KR" dirty="0" smtClean="0">
+                <a:solidFill>
+                  <a:schemeClr val="bg1">
+                    <a:lumMod val="85000"/>
+                    <a:lumOff val="15000"/>
+                  </a:schemeClr>
+                </a:solidFill>
+              </a:rPr>
+              <a:t>- Spotify is really making a music trend?</a:t>
+            </a:r>
+          </a:p>
+          <a:p>
+            <a:pPr marL="0" lvl="0" indent="0" fontAlgn="base" latinLnBrk="0">
+              <a:buNone/>
+            </a:pPr>
             <a:r>
               <a:rPr lang="en-US" altLang="ko-KR" dirty="0" smtClean="0"/>
-              <a:t>Sets </a:t>
+              <a:t>  </a:t>
+            </a:r>
+            <a:r>
+              <a:rPr lang="en-US" altLang="ko-KR" dirty="0" smtClean="0">
+                <a:sym typeface="Wingdings" panose="05000000000000000000" pitchFamily="2" charset="2"/>
+              </a:rPr>
+              <a:t> Compare with others’ list</a:t>
+            </a:r>
+            <a:endParaRPr lang="en-US" altLang="ko-KR" dirty="0"/>
+          </a:p>
+          <a:p>
+            <a:pPr marL="0" lvl="0" indent="0" fontAlgn="base" latinLnBrk="0">
+              <a:buNone/>
+            </a:pPr>
+            <a:r>
+              <a:rPr lang="en-US" altLang="ko-KR" dirty="0" smtClean="0">
+                <a:solidFill>
+                  <a:schemeClr val="bg1">
+                    <a:lumMod val="85000"/>
+                    <a:lumOff val="15000"/>
+                  </a:schemeClr>
+                </a:solidFill>
+              </a:rPr>
+              <a:t>- Why many people uses Spotify’s data?</a:t>
+            </a:r>
+          </a:p>
+          <a:p>
+            <a:pPr marL="0" lvl="0" indent="0" fontAlgn="base" latinLnBrk="0">
+              <a:buNone/>
+            </a:pPr>
+            <a:r>
+              <a:rPr lang="en-US" altLang="ko-KR" dirty="0" smtClean="0"/>
+              <a:t>  </a:t>
+            </a:r>
+            <a:r>
+              <a:rPr lang="en-US" altLang="ko-KR" dirty="0" smtClean="0">
+                <a:sym typeface="Wingdings" panose="05000000000000000000" pitchFamily="2" charset="2"/>
+              </a:rPr>
+              <a:t> Web scraping and using it</a:t>
+            </a:r>
+            <a:endParaRPr lang="en-US" altLang="ko-KR" dirty="0"/>
+          </a:p>
+          <a:p>
+            <a:pPr lvl="0" fontAlgn="base" latinLnBrk="0">
+              <a:buFontTx/>
+              <a:buChar char="-"/>
+            </a:pPr>
+            <a:r>
+              <a:rPr lang="en-US" altLang="ko-KR" dirty="0" smtClean="0">
+                <a:solidFill>
+                  <a:schemeClr val="bg1">
+                    <a:lumMod val="85000"/>
+                    <a:lumOff val="15000"/>
+                  </a:schemeClr>
+                </a:solidFill>
+              </a:rPr>
+              <a:t>Are these reliable?</a:t>
+            </a:r>
+          </a:p>
+          <a:p>
+            <a:pPr marL="0" lvl="0" indent="0" fontAlgn="base" latinLnBrk="0">
+              <a:buNone/>
+            </a:pPr>
+            <a:r>
+              <a:rPr lang="en-US" altLang="ko-KR" dirty="0" smtClean="0"/>
+              <a:t>  </a:t>
+            </a:r>
+            <a:r>
+              <a:rPr lang="en-US" altLang="ko-KR" dirty="0" smtClean="0">
+                <a:sym typeface="Wingdings" panose="05000000000000000000" pitchFamily="2" charset="2"/>
+              </a:rPr>
+              <a:t> …</a:t>
+            </a:r>
+            <a:endParaRPr lang="ko-KR" altLang="en-US" dirty="0"/>
+          </a:p>
+        </p:txBody>
+      </p:sp>
+    </p:spTree>
+    <p:extLst>
+      <p:ext uri="{BB962C8B-B14F-4D97-AF65-F5344CB8AC3E}">
+        <p14:creationId xmlns:p14="http://schemas.microsoft.com/office/powerpoint/2010/main" val="3658189680"/>
+      </p:ext>
+    </p:extLst>
+  </p:cSld>
+  <p:clrMapOvr>
+    <a:masterClrMapping/>
+  </p:clrMapOvr>
+  <p:timing>
+    <p:tnLst>
+      <p:par>
+        <p:cTn id="1" dur="indefinite" restart="never" nodeType="tmRoot"/>
+      </p:par>
+    </p:tnLst>
+  </p:timing>
+</p:sld>
+</file>
+
+<file path=ppt/slides/slide6.xml><?xml version="1.0" encoding="utf-8"?>
+<p:sld xmlns:a="http://schemas.openxmlformats.org/drawingml/2006/main" xmlns:r="http://schemas.openxmlformats.org/officeDocument/2006/relationships" xmlns:p="http://schemas.openxmlformats.org/presentationml/2006/main">
+  <p:cSld>
+    <p:spTree>
+      <p:nvGrpSpPr>
+        <p:cNvPr id="1" name=""/>
+        <p:cNvGrpSpPr/>
+        <p:nvPr/>
+      </p:nvGrpSpPr>
+      <p:grpSpPr>
+        <a:xfrm>
+          <a:off x="0" y="0"/>
+          <a:ext cx="0" cy="0"/>
+          <a:chOff x="0" y="0"/>
+          <a:chExt cx="0" cy="0"/>
+        </a:xfrm>
+      </p:grpSpPr>
+      <p:sp>
+        <p:nvSpPr>
+          <p:cNvPr id="2" name="제목 1"/>
+          <p:cNvSpPr>
+            <a:spLocks noGrp="1"/>
+          </p:cNvSpPr>
+          <p:nvPr>
+            <p:ph type="title"/>
+          </p:nvPr>
+        </p:nvSpPr>
+        <p:spPr/>
+        <p:txBody>
+          <a:bodyPr/>
+          <a:lstStyle/>
+          <a:p>
+            <a:r>
+              <a:rPr lang="en-US" altLang="ko-KR" dirty="0"/>
+              <a:t>exploratory </a:t>
+            </a:r>
+            <a:r>
+              <a:rPr lang="en-US" altLang="ko-KR" dirty="0" smtClean="0"/>
+              <a:t>candidates</a:t>
+            </a:r>
+            <a:endParaRPr lang="ko-KR" altLang="en-US" dirty="0"/>
+          </a:p>
+        </p:txBody>
+      </p:sp>
+      <p:pic>
+        <p:nvPicPr>
+          <p:cNvPr id="9" name="그림 8"/>
+          <p:cNvPicPr>
+            <a:picLocks noChangeAspect="1"/>
+          </p:cNvPicPr>
+          <p:nvPr/>
+        </p:nvPicPr>
+        <p:blipFill>
+          <a:blip r:embed="rId2">
+            <a:extLst>
+              <a:ext uri="{28A0092B-C50C-407E-A947-70E740481C1C}">
+                <a14:useLocalDpi xmlns:a14="http://schemas.microsoft.com/office/drawing/2010/main" val="0"/>
+              </a:ext>
+            </a:extLst>
+          </a:blip>
+          <a:stretch>
+            <a:fillRect/>
+          </a:stretch>
+        </p:blipFill>
+        <p:spPr>
+          <a:xfrm>
+            <a:off x="127000" y="1936328"/>
+            <a:ext cx="8890000" cy="4445000"/>
+          </a:xfrm>
+          <a:prstGeom prst="rect">
+            <a:avLst/>
+          </a:prstGeom>
+        </p:spPr>
+      </p:pic>
+    </p:spTree>
+    <p:extLst>
+      <p:ext uri="{BB962C8B-B14F-4D97-AF65-F5344CB8AC3E}">
+        <p14:creationId xmlns:p14="http://schemas.microsoft.com/office/powerpoint/2010/main" val="3726700153"/>
+      </p:ext>
+    </p:extLst>
+  </p:cSld>
+  <p:clrMapOvr>
+    <a:masterClrMapping/>
+  </p:clrMapOvr>
+</p:sld>
+</file>
+
+<file path=ppt/slides/slide7.xml><?xml version="1.0" encoding="utf-8"?>
+<p:sld xmlns:a="http://schemas.openxmlformats.org/drawingml/2006/main" xmlns:r="http://schemas.openxmlformats.org/officeDocument/2006/relationships" xmlns:p="http://schemas.openxmlformats.org/presentationml/2006/main">
+  <p:cSld>
+    <p:spTree>
+      <p:nvGrpSpPr>
+        <p:cNvPr id="1" name=""/>
+        <p:cNvGrpSpPr/>
+        <p:nvPr/>
+      </p:nvGrpSpPr>
+      <p:grpSpPr>
+        <a:xfrm>
+          <a:off x="0" y="0"/>
+          <a:ext cx="0" cy="0"/>
+          <a:chOff x="0" y="0"/>
+          <a:chExt cx="0" cy="0"/>
+        </a:xfrm>
+      </p:grpSpPr>
+      <p:sp>
+        <p:nvSpPr>
+          <p:cNvPr id="2" name="제목 1"/>
+          <p:cNvSpPr>
+            <a:spLocks noGrp="1"/>
+          </p:cNvSpPr>
+          <p:nvPr>
+            <p:ph type="title"/>
+          </p:nvPr>
+        </p:nvSpPr>
+        <p:spPr/>
+        <p:txBody>
+          <a:bodyPr/>
+          <a:lstStyle/>
+          <a:p>
+            <a:r>
+              <a:rPr lang="en-US" altLang="ko-KR" dirty="0" smtClean="0"/>
+              <a:t>Data Sets </a:t>
             </a:r>
             <a:r>
               <a:rPr lang="en-US" altLang="ko-KR" sz="2800" dirty="0" smtClean="0"/>
@@ -11997,7 +12516,6 @@
               <a:rPr lang="en-US" altLang="ko-KR" sz="1800" dirty="0" smtClean="0"/>
               <a:t>artists.youtube.com/charts/tracks)</a:t>
             </a:r>
-            <a:endParaRPr lang="en-US" altLang="ko-KR" sz="1800" dirty="0" smtClean="0"/>
           </a:p>
           <a:p>
             <a:endParaRPr lang="en-US" altLang="ko-KR" sz="2800" dirty="0" smtClean="0"/>
@@ -12123,7 +12641,7 @@
 </p:sld>
 </file>
 
-<file path=ppt/slides/slide6.xml><?xml version="1.0" encoding="utf-8"?>
+<file path=ppt/slides/slide8.xml><?xml version="1.0" encoding="utf-8"?>
 <p:sld xmlns:a="http://schemas.openxmlformats.org/drawingml/2006/main" xmlns:r="http://schemas.openxmlformats.org/officeDocument/2006/relationships" xmlns:p="http://schemas.openxmlformats.org/presentationml/2006/main">
   <p:cSld>
     <p:spTree>
@@ -12350,7 +12868,7 @@
 </p:sld>
 </file>
 
-<file path=ppt/slides/slide7.xml><?xml version="1.0" encoding="utf-8"?>
+<file path=ppt/slides/slide9.xml><?xml version="1.0" encoding="utf-8"?>
 <p:sld xmlns:a="http://schemas.openxmlformats.org/drawingml/2006/main" xmlns:r="http://schemas.openxmlformats.org/officeDocument/2006/relationships" xmlns:p="http://schemas.openxmlformats.org/presentationml/2006/main">
   <p:cSld>
     <p:spTree>
@@ -12538,324 +13056,6 @@
     <p:extLst>
       <p:ext uri="{BB962C8B-B14F-4D97-AF65-F5344CB8AC3E}">
         <p14:creationId xmlns:p14="http://schemas.microsoft.com/office/powerpoint/2010/main" val="3729569470"/>
-      </p:ext>
-    </p:extLst>
-  </p:cSld>
-  <p:clrMapOvr>
-    <a:masterClrMapping/>
-  </p:clrMapOvr>
-</p:sld>
-</file>
-
-<file path=ppt/slides/slide8.xml><?xml version="1.0" encoding="utf-8"?>
-<p:sld xmlns:a="http://schemas.openxmlformats.org/drawingml/2006/main" xmlns:r="http://schemas.openxmlformats.org/officeDocument/2006/relationships" xmlns:p="http://schemas.openxmlformats.org/presentationml/2006/main">
-  <p:cSld>
-    <p:spTree>
-      <p:nvGrpSpPr>
-        <p:cNvPr id="1" name=""/>
-        <p:cNvGrpSpPr/>
-        <p:nvPr/>
-      </p:nvGrpSpPr>
-      <p:grpSpPr>
-        <a:xfrm>
-          <a:off x="0" y="0"/>
-          <a:ext cx="0" cy="0"/>
-          <a:chOff x="0" y="0"/>
-          <a:chExt cx="0" cy="0"/>
-        </a:xfrm>
-      </p:grpSpPr>
-      <p:sp>
-        <p:nvSpPr>
-          <p:cNvPr id="2" name="제목 1"/>
-          <p:cNvSpPr>
-            <a:spLocks noGrp="1"/>
-          </p:cNvSpPr>
-          <p:nvPr>
-            <p:ph type="title"/>
-          </p:nvPr>
-        </p:nvSpPr>
-        <p:spPr/>
-        <p:txBody>
-          <a:bodyPr/>
-          <a:lstStyle/>
-          <a:p>
-            <a:r>
-              <a:rPr lang="en-US" altLang="ko-KR" dirty="0" smtClean="0"/>
-              <a:t>Billboard scraping</a:t>
-            </a:r>
-            <a:endParaRPr lang="ko-KR" altLang="en-US" dirty="0"/>
-          </a:p>
-        </p:txBody>
-      </p:sp>
-      <p:sp>
-        <p:nvSpPr>
-          <p:cNvPr id="4" name="직사각형 3"/>
-          <p:cNvSpPr/>
-          <p:nvPr/>
-        </p:nvSpPr>
-        <p:spPr>
-          <a:xfrm>
-            <a:off x="7208833" y="476672"/>
-            <a:ext cx="1611639" cy="504056"/>
-          </a:xfrm>
-          <a:prstGeom prst="rect">
-            <a:avLst/>
-          </a:prstGeom>
-          <a:scene3d>
-            <a:camera prst="perspectiveLeft"/>
-            <a:lightRig rig="threePt" dir="t"/>
-          </a:scene3d>
-        </p:spPr>
-        <p:style>
-          <a:lnRef idx="2">
-            <a:schemeClr val="accent1">
-              <a:shade val="50000"/>
-            </a:schemeClr>
-          </a:lnRef>
-          <a:fillRef idx="1">
-            <a:schemeClr val="accent1"/>
-          </a:fillRef>
-          <a:effectRef idx="0">
-            <a:schemeClr val="accent1"/>
-          </a:effectRef>
-          <a:fontRef idx="minor">
-            <a:schemeClr val="lt1"/>
-          </a:fontRef>
-        </p:style>
-        <p:txBody>
-          <a:bodyPr rtlCol="0" anchor="ctr"/>
-          <a:lstStyle/>
-          <a:p>
-            <a:pPr algn="ctr"/>
-            <a:r>
-              <a:rPr lang="en-US" altLang="ko-KR" sz="2000" b="1" dirty="0" err="1" smtClean="0">
-                <a:ln w="1905"/>
-                <a:gradFill>
-                  <a:gsLst>
-                    <a:gs pos="0">
-                      <a:schemeClr val="accent6">
-                        <a:shade val="20000"/>
-                        <a:satMod val="200000"/>
-                      </a:schemeClr>
-                    </a:gs>
-                    <a:gs pos="78000">
-                      <a:schemeClr val="accent6">
-                        <a:tint val="90000"/>
-                        <a:shade val="89000"/>
-                        <a:satMod val="220000"/>
-                      </a:schemeClr>
-                    </a:gs>
-                    <a:gs pos="100000">
-                      <a:schemeClr val="accent6">
-                        <a:tint val="12000"/>
-                        <a:satMod val="255000"/>
-                      </a:schemeClr>
-                    </a:gs>
-                  </a:gsLst>
-                  <a:lin ang="5400000"/>
-                </a:gradFill>
-                <a:effectLst>
-                  <a:innerShdw blurRad="69850" dist="43180" dir="5400000">
-                    <a:srgbClr val="000000">
-                      <a:alpha val="65000"/>
-                    </a:srgbClr>
-                  </a:innerShdw>
-                </a:effectLst>
-              </a:rPr>
-              <a:t>Scrapy</a:t>
-            </a:r>
-            <a:endParaRPr lang="ko-KR" altLang="en-US" sz="2000" b="1" dirty="0">
-              <a:ln w="1905"/>
-              <a:gradFill>
-                <a:gsLst>
-                  <a:gs pos="0">
-                    <a:schemeClr val="accent6">
-                      <a:shade val="20000"/>
-                      <a:satMod val="200000"/>
-                    </a:schemeClr>
-                  </a:gs>
-                  <a:gs pos="78000">
-                    <a:schemeClr val="accent6">
-                      <a:tint val="90000"/>
-                      <a:shade val="89000"/>
-                      <a:satMod val="220000"/>
-                    </a:schemeClr>
-                  </a:gs>
-                  <a:gs pos="100000">
-                    <a:schemeClr val="accent6">
-                      <a:tint val="12000"/>
-                      <a:satMod val="255000"/>
-                    </a:schemeClr>
-                  </a:gs>
-                </a:gsLst>
-                <a:lin ang="5400000"/>
-              </a:gradFill>
-              <a:effectLst>
-                <a:innerShdw blurRad="69850" dist="43180" dir="5400000">
-                  <a:srgbClr val="000000">
-                    <a:alpha val="65000"/>
-                  </a:srgbClr>
-                </a:innerShdw>
-              </a:effectLst>
-            </a:endParaRPr>
-          </a:p>
-        </p:txBody>
-      </p:sp>
-      <p:pic>
-        <p:nvPicPr>
-          <p:cNvPr id="5" name="그림 4"/>
-          <p:cNvPicPr>
-            <a:picLocks noChangeAspect="1"/>
-          </p:cNvPicPr>
-          <p:nvPr/>
-        </p:nvPicPr>
-        <p:blipFill>
-          <a:blip r:embed="rId2">
-            <a:extLst>
-              <a:ext uri="{28A0092B-C50C-407E-A947-70E740481C1C}">
-                <a14:useLocalDpi xmlns:a14="http://schemas.microsoft.com/office/drawing/2010/main" val="0"/>
-              </a:ext>
-            </a:extLst>
-          </a:blip>
-          <a:stretch>
-            <a:fillRect/>
-          </a:stretch>
-        </p:blipFill>
-        <p:spPr>
-          <a:xfrm>
-            <a:off x="0" y="1712354"/>
-            <a:ext cx="9144000" cy="3433291"/>
-          </a:xfrm>
-          <a:prstGeom prst="rect">
-            <a:avLst/>
-          </a:prstGeom>
-        </p:spPr>
-      </p:pic>
-    </p:spTree>
-    <p:extLst>
-      <p:ext uri="{BB962C8B-B14F-4D97-AF65-F5344CB8AC3E}">
-        <p14:creationId xmlns:p14="http://schemas.microsoft.com/office/powerpoint/2010/main" val="3780983472"/>
-      </p:ext>
-    </p:extLst>
-  </p:cSld>
-  <p:clrMapOvr>
-    <a:masterClrMapping/>
-  </p:clrMapOvr>
-  <p:timing>
-    <p:tnLst>
-      <p:par>
-        <p:cTn id="1" dur="indefinite" restart="never" nodeType="tmRoot"/>
-      </p:par>
-    </p:tnLst>
-  </p:timing>
-</p:sld>
-</file>
-
-<file path=ppt/slides/slide9.xml><?xml version="1.0" encoding="utf-8"?>
-<p:sld xmlns:a="http://schemas.openxmlformats.org/drawingml/2006/main" xmlns:r="http://schemas.openxmlformats.org/officeDocument/2006/relationships" xmlns:p="http://schemas.openxmlformats.org/presentationml/2006/main">
-  <p:cSld>
-    <p:spTree>
-      <p:nvGrpSpPr>
-        <p:cNvPr id="1" name=""/>
-        <p:cNvGrpSpPr/>
-        <p:nvPr/>
-      </p:nvGrpSpPr>
-      <p:grpSpPr>
-        <a:xfrm>
-          <a:off x="0" y="0"/>
-          <a:ext cx="0" cy="0"/>
-          <a:chOff x="0" y="0"/>
-          <a:chExt cx="0" cy="0"/>
-        </a:xfrm>
-      </p:grpSpPr>
-      <p:sp>
-        <p:nvSpPr>
-          <p:cNvPr id="2" name="제목 1"/>
-          <p:cNvSpPr>
-            <a:spLocks noGrp="1"/>
-          </p:cNvSpPr>
-          <p:nvPr>
-            <p:ph type="title"/>
-          </p:nvPr>
-        </p:nvSpPr>
-        <p:spPr/>
-        <p:txBody>
-          <a:bodyPr/>
-          <a:lstStyle/>
-          <a:p>
-            <a:r>
-              <a:rPr lang="en-US" altLang="ko-KR" dirty="0" smtClean="0"/>
-              <a:t>Why Spotify’s dataset ?</a:t>
-            </a:r>
-            <a:endParaRPr lang="ko-KR" altLang="en-US" dirty="0"/>
-          </a:p>
-        </p:txBody>
-      </p:sp>
-      <p:sp>
-        <p:nvSpPr>
-          <p:cNvPr id="3" name="내용 개체 틀 2"/>
-          <p:cNvSpPr>
-            <a:spLocks noGrp="1"/>
-          </p:cNvSpPr>
-          <p:nvPr>
-            <p:ph idx="1"/>
-          </p:nvPr>
-        </p:nvSpPr>
-        <p:spPr/>
-        <p:txBody>
-          <a:bodyPr/>
-          <a:lstStyle/>
-          <a:p>
-            <a:r>
-              <a:rPr lang="en-US" altLang="ko-KR" dirty="0" smtClean="0"/>
-              <a:t>Easy to web-scrape</a:t>
-            </a:r>
-          </a:p>
-          <a:p>
-            <a:r>
-              <a:rPr lang="en-US" altLang="ko-KR" dirty="0" smtClean="0"/>
-              <a:t>Easy to get (without web-scrape)</a:t>
-            </a:r>
-          </a:p>
-          <a:p>
-            <a:r>
-              <a:rPr lang="en-US" altLang="ko-KR" dirty="0" smtClean="0"/>
-              <a:t>Provide various data set</a:t>
-            </a:r>
-          </a:p>
-          <a:p>
-            <a:pPr lvl="1"/>
-            <a:r>
-              <a:rPr lang="en-US" altLang="ko-KR" dirty="0" smtClean="0"/>
-              <a:t>Regional, Daily, Weekly</a:t>
-            </a:r>
-          </a:p>
-          <a:p>
-            <a:r>
-              <a:rPr lang="en-US" altLang="ko-KR" dirty="0" smtClean="0"/>
-              <a:t>Long term monitored data</a:t>
-            </a:r>
-          </a:p>
-          <a:p>
-            <a:pPr lvl="1"/>
-            <a:r>
-              <a:rPr lang="en-US" altLang="ko-KR" dirty="0" smtClean="0"/>
-              <a:t>Every year</a:t>
-            </a:r>
-          </a:p>
-          <a:p>
-            <a:r>
-              <a:rPr lang="en-US" altLang="ko-KR" dirty="0" smtClean="0"/>
-              <a:t>Quick update</a:t>
-            </a:r>
-            <a:endParaRPr lang="ko-KR" altLang="en-US" dirty="0"/>
-          </a:p>
-        </p:txBody>
-      </p:sp>
-    </p:spTree>
-    <p:extLst>
-      <p:ext uri="{BB962C8B-B14F-4D97-AF65-F5344CB8AC3E}">
-        <p14:creationId xmlns:p14="http://schemas.microsoft.com/office/powerpoint/2010/main" val="1226395898"/>
       </p:ext>
     </p:extLst>
   </p:cSld>

</xml_diff>